<commit_message>
poster + working democode
finised demo code
</commit_message>
<xml_diff>
--- a/Advanced pcb labo NL.pptx
+++ b/Advanced pcb labo NL.pptx
@@ -4571,7 +4571,6 @@
               <a:rPr lang="en-US" dirty="0"/>
               <a:t> </a:t>
             </a:r>
-            <a:endParaRPr lang="en-US" dirty="0"/>
           </a:p>
         </p:txBody>
       </p:sp>
@@ -5077,7 +5076,6 @@
               <a:rPr lang="en-US" dirty="0"/>
               <a:t>ESP8266 V2 &amp; V3</a:t>
             </a:r>
-            <a:endParaRPr lang="en-US" dirty="0"/>
           </a:p>
         </p:txBody>
       </p:sp>
@@ -8624,7 +8622,7 @@
             </a:r>
             <a:r>
               <a:rPr lang="en-US" dirty="0"/>
-              <a:t> 0</a:t>
+              <a:t> </a:t>
             </a:r>
           </a:p>
         </p:txBody>
@@ -8812,6 +8810,22 @@
             <a:r>
               <a:rPr lang="en-US" dirty="0"/>
               <a:t> </a:t>
+            </a:r>
+            <a:r>
+              <a:rPr lang="en-US" dirty="0" err="1"/>
+              <a:t>en</a:t>
+            </a:r>
+            <a:r>
+              <a:rPr lang="en-US" dirty="0"/>
+              <a:t> </a:t>
+            </a:r>
+            <a:r>
+              <a:rPr lang="en-US" dirty="0" err="1"/>
+              <a:t>denken</a:t>
+            </a:r>
+            <a:r>
+              <a:rPr lang="en-US" dirty="0"/>
+              <a:t> over dese</a:t>
             </a:r>
           </a:p>
           <a:p>
@@ -9728,7 +9742,6 @@
               <a:rPr lang="en-US" dirty="0"/>
               <a:t> microcontroller V3 </a:t>
             </a:r>
-            <a:endParaRPr lang="en-US" dirty="0"/>
           </a:p>
         </p:txBody>
       </p:sp>

</xml_diff>